<commit_message>
finished presentation and slides
</commit_message>
<xml_diff>
--- a/MockitoPresentation.pptx
+++ b/MockitoPresentation.pptx
@@ -15,8 +15,7 @@
     <p:sldId id="282" r:id="rId9"/>
     <p:sldId id="278" r:id="rId10"/>
     <p:sldId id="276" r:id="rId11"/>
-    <p:sldId id="280" r:id="rId12"/>
-    <p:sldId id="281" r:id="rId13"/>
+    <p:sldId id="281" r:id="rId12"/>
   </p:sldIdLst>
   <p:sldSz cx="9144000" cy="6858000" type="screen4x3"/>
   <p:notesSz cx="6858000" cy="9144000"/>
@@ -300,7 +299,7 @@
             <a:fld id="{1BA50D42-C9CD-4801-B293-61D1F53EC57E}" type="datetimeFigureOut">
               <a:rPr lang="de-DE" smtClean="0"/>
               <a:pPr/>
-              <a:t>04.06.2018</a:t>
+              <a:t>05.06.2018</a:t>
             </a:fld>
             <a:endParaRPr lang="de-DE"/>
           </a:p>
@@ -467,7 +466,7 @@
             <a:fld id="{1BA50D42-C9CD-4801-B293-61D1F53EC57E}" type="datetimeFigureOut">
               <a:rPr lang="de-DE" smtClean="0"/>
               <a:pPr/>
-              <a:t>04.06.2018</a:t>
+              <a:t>05.06.2018</a:t>
             </a:fld>
             <a:endParaRPr lang="de-DE"/>
           </a:p>
@@ -644,7 +643,7 @@
             <a:fld id="{1BA50D42-C9CD-4801-B293-61D1F53EC57E}" type="datetimeFigureOut">
               <a:rPr lang="de-DE" smtClean="0"/>
               <a:pPr/>
-              <a:t>04.06.2018</a:t>
+              <a:t>05.06.2018</a:t>
             </a:fld>
             <a:endParaRPr lang="de-DE"/>
           </a:p>
@@ -811,7 +810,7 @@
             <a:fld id="{1BA50D42-C9CD-4801-B293-61D1F53EC57E}" type="datetimeFigureOut">
               <a:rPr lang="de-DE" smtClean="0"/>
               <a:pPr/>
-              <a:t>04.06.2018</a:t>
+              <a:t>05.06.2018</a:t>
             </a:fld>
             <a:endParaRPr lang="de-DE"/>
           </a:p>
@@ -1054,7 +1053,7 @@
             <a:fld id="{1BA50D42-C9CD-4801-B293-61D1F53EC57E}" type="datetimeFigureOut">
               <a:rPr lang="de-DE" smtClean="0"/>
               <a:pPr/>
-              <a:t>04.06.2018</a:t>
+              <a:t>05.06.2018</a:t>
             </a:fld>
             <a:endParaRPr lang="de-DE"/>
           </a:p>
@@ -1339,7 +1338,7 @@
             <a:fld id="{1BA50D42-C9CD-4801-B293-61D1F53EC57E}" type="datetimeFigureOut">
               <a:rPr lang="de-DE" smtClean="0"/>
               <a:pPr/>
-              <a:t>04.06.2018</a:t>
+              <a:t>05.06.2018</a:t>
             </a:fld>
             <a:endParaRPr lang="de-DE"/>
           </a:p>
@@ -1758,7 +1757,7 @@
             <a:fld id="{1BA50D42-C9CD-4801-B293-61D1F53EC57E}" type="datetimeFigureOut">
               <a:rPr lang="de-DE" smtClean="0"/>
               <a:pPr/>
-              <a:t>04.06.2018</a:t>
+              <a:t>05.06.2018</a:t>
             </a:fld>
             <a:endParaRPr lang="de-DE"/>
           </a:p>
@@ -1873,7 +1872,7 @@
             <a:fld id="{1BA50D42-C9CD-4801-B293-61D1F53EC57E}" type="datetimeFigureOut">
               <a:rPr lang="de-DE" smtClean="0"/>
               <a:pPr/>
-              <a:t>04.06.2018</a:t>
+              <a:t>05.06.2018</a:t>
             </a:fld>
             <a:endParaRPr lang="de-DE"/>
           </a:p>
@@ -1965,7 +1964,7 @@
             <a:fld id="{1BA50D42-C9CD-4801-B293-61D1F53EC57E}" type="datetimeFigureOut">
               <a:rPr lang="de-DE" smtClean="0"/>
               <a:pPr/>
-              <a:t>04.06.2018</a:t>
+              <a:t>05.06.2018</a:t>
             </a:fld>
             <a:endParaRPr lang="de-DE"/>
           </a:p>
@@ -2239,7 +2238,7 @@
             <a:fld id="{1BA50D42-C9CD-4801-B293-61D1F53EC57E}" type="datetimeFigureOut">
               <a:rPr lang="de-DE" smtClean="0"/>
               <a:pPr/>
-              <a:t>04.06.2018</a:t>
+              <a:t>05.06.2018</a:t>
             </a:fld>
             <a:endParaRPr lang="de-DE"/>
           </a:p>
@@ -2489,7 +2488,7 @@
             <a:fld id="{1BA50D42-C9CD-4801-B293-61D1F53EC57E}" type="datetimeFigureOut">
               <a:rPr lang="de-DE" smtClean="0"/>
               <a:pPr/>
-              <a:t>04.06.2018</a:t>
+              <a:t>05.06.2018</a:t>
             </a:fld>
             <a:endParaRPr lang="de-DE"/>
           </a:p>
@@ -2699,7 +2698,7 @@
             <a:fld id="{1BA50D42-C9CD-4801-B293-61D1F53EC57E}" type="datetimeFigureOut">
               <a:rPr lang="de-DE" smtClean="0"/>
               <a:pPr/>
-              <a:t>04.06.2018</a:t>
+              <a:t>05.06.2018</a:t>
             </a:fld>
             <a:endParaRPr lang="de-DE"/>
           </a:p>
@@ -3539,602 +3538,6 @@
 </file>
 
 <file path=ppt/slides/slide11.xml><?xml version="1.0" encoding="utf-8"?>
-<p:sld xmlns:a="http://schemas.openxmlformats.org/drawingml/2006/main" xmlns:r="http://schemas.openxmlformats.org/officeDocument/2006/relationships" xmlns:p="http://schemas.openxmlformats.org/presentationml/2006/main">
-  <p:cSld>
-    <p:spTree>
-      <p:nvGrpSpPr>
-        <p:cNvPr id="1" name=""/>
-        <p:cNvGrpSpPr/>
-        <p:nvPr/>
-      </p:nvGrpSpPr>
-      <p:grpSpPr>
-        <a:xfrm>
-          <a:off x="0" y="0"/>
-          <a:ext cx="0" cy="0"/>
-          <a:chOff x="0" y="0"/>
-          <a:chExt cx="0" cy="0"/>
-        </a:xfrm>
-      </p:grpSpPr>
-      <p:sp>
-        <p:nvSpPr>
-          <p:cNvPr id="4" name="Rechteck 3"/>
-          <p:cNvSpPr/>
-          <p:nvPr/>
-        </p:nvSpPr>
-        <p:spPr>
-          <a:xfrm>
-            <a:off x="0" y="0"/>
-            <a:ext cx="3643306" cy="6858000"/>
-          </a:xfrm>
-          <a:prstGeom prst="rect">
-            <a:avLst/>
-          </a:prstGeom>
-          <a:solidFill>
-            <a:srgbClr val="009900"/>
-          </a:solidFill>
-          <a:ln>
-            <a:solidFill>
-              <a:srgbClr val="009900"/>
-            </a:solidFill>
-          </a:ln>
-        </p:spPr>
-        <p:style>
-          <a:lnRef idx="2">
-            <a:schemeClr val="accent1">
-              <a:shade val="50000"/>
-            </a:schemeClr>
-          </a:lnRef>
-          <a:fillRef idx="1">
-            <a:schemeClr val="accent1"/>
-          </a:fillRef>
-          <a:effectRef idx="0">
-            <a:schemeClr val="accent1"/>
-          </a:effectRef>
-          <a:fontRef idx="minor">
-            <a:schemeClr val="lt1"/>
-          </a:fontRef>
-        </p:style>
-        <p:txBody>
-          <a:bodyPr rtlCol="0" anchor="ctr"/>
-          <a:lstStyle/>
-          <a:p>
-            <a:pPr algn="ctr"/>
-            <a:endParaRPr lang="en-US"/>
-          </a:p>
-        </p:txBody>
-      </p:sp>
-      <p:sp>
-        <p:nvSpPr>
-          <p:cNvPr id="2" name="Titel 1"/>
-          <p:cNvSpPr>
-            <a:spLocks noGrp="1"/>
-          </p:cNvSpPr>
-          <p:nvPr>
-            <p:ph type="title"/>
-          </p:nvPr>
-        </p:nvSpPr>
-        <p:spPr>
-          <a:xfrm>
-            <a:off x="0" y="2743200"/>
-            <a:ext cx="3643306" cy="1143000"/>
-          </a:xfrm>
-        </p:spPr>
-        <p:txBody>
-          <a:bodyPr>
-            <a:normAutofit/>
-          </a:bodyPr>
-          <a:lstStyle/>
-          <a:p>
-            <a:r>
-              <a:rPr lang="de-DE" dirty="0" smtClean="0">
-                <a:solidFill>
-                  <a:schemeClr val="bg1"/>
-                </a:solidFill>
-              </a:rPr>
-              <a:t>Best </a:t>
-            </a:r>
-            <a:r>
-              <a:rPr lang="de-DE" dirty="0" err="1" smtClean="0">
-                <a:solidFill>
-                  <a:schemeClr val="bg1"/>
-                </a:solidFill>
-              </a:rPr>
-              <a:t>practices</a:t>
-            </a:r>
-            <a:endParaRPr lang="de-DE" dirty="0">
-              <a:solidFill>
-                <a:schemeClr val="bg1"/>
-              </a:solidFill>
-            </a:endParaRPr>
-          </a:p>
-        </p:txBody>
-      </p:sp>
-      <p:sp>
-        <p:nvSpPr>
-          <p:cNvPr id="3" name="Inhaltsplatzhalter 2"/>
-          <p:cNvSpPr>
-            <a:spLocks noGrp="1"/>
-          </p:cNvSpPr>
-          <p:nvPr>
-            <p:ph idx="1"/>
-          </p:nvPr>
-        </p:nvSpPr>
-        <p:spPr>
-          <a:xfrm>
-            <a:off x="3643306" y="1600200"/>
-            <a:ext cx="5500694" cy="4525963"/>
-          </a:xfrm>
-        </p:spPr>
-        <p:txBody>
-          <a:bodyPr>
-            <a:normAutofit/>
-          </a:bodyPr>
-          <a:lstStyle/>
-          <a:p>
-            <a:r>
-              <a:rPr lang="de-DE" dirty="0" err="1" smtClean="0"/>
-              <a:t>Prefer</a:t>
-            </a:r>
-            <a:r>
-              <a:rPr lang="de-DE" dirty="0" smtClean="0"/>
-              <a:t> </a:t>
-            </a:r>
-            <a:r>
-              <a:rPr lang="de-DE" dirty="0" err="1" smtClean="0"/>
-              <a:t>when</a:t>
-            </a:r>
-            <a:r>
-              <a:rPr lang="de-DE" dirty="0" smtClean="0"/>
-              <a:t> / </a:t>
-            </a:r>
-            <a:r>
-              <a:rPr lang="de-DE" dirty="0" err="1" smtClean="0"/>
-              <a:t>thenReturn</a:t>
-            </a:r>
-            <a:r>
-              <a:rPr lang="de-DE" dirty="0" smtClean="0"/>
-              <a:t> </a:t>
-            </a:r>
-            <a:r>
-              <a:rPr lang="de-DE" dirty="0" err="1" smtClean="0"/>
-              <a:t>over</a:t>
-            </a:r>
-            <a:r>
-              <a:rPr lang="de-DE" dirty="0" smtClean="0"/>
-              <a:t> </a:t>
-            </a:r>
-            <a:r>
-              <a:rPr lang="de-DE" dirty="0" err="1" smtClean="0"/>
-              <a:t>doReturn</a:t>
-            </a:r>
-            <a:r>
-              <a:rPr lang="de-DE" dirty="0" smtClean="0"/>
-              <a:t> / </a:t>
-            </a:r>
-            <a:r>
-              <a:rPr lang="de-DE" dirty="0" err="1" smtClean="0"/>
-              <a:t>when</a:t>
-            </a:r>
-            <a:endParaRPr lang="de-DE" dirty="0" smtClean="0"/>
-          </a:p>
-          <a:p>
-            <a:pPr lvl="1"/>
-            <a:r>
-              <a:rPr lang="de-DE" dirty="0" err="1" smtClean="0"/>
-              <a:t>When</a:t>
-            </a:r>
-            <a:r>
-              <a:rPr lang="de-DE" dirty="0" smtClean="0"/>
-              <a:t> / </a:t>
-            </a:r>
-            <a:r>
-              <a:rPr lang="de-DE" dirty="0" err="1" smtClean="0"/>
-              <a:t>thenReturn</a:t>
-            </a:r>
-            <a:r>
-              <a:rPr lang="de-DE" dirty="0" smtClean="0"/>
-              <a:t> </a:t>
-            </a:r>
-            <a:r>
-              <a:rPr lang="de-DE" dirty="0" err="1" smtClean="0"/>
-              <a:t>is</a:t>
-            </a:r>
-            <a:r>
-              <a:rPr lang="de-DE" dirty="0" smtClean="0"/>
-              <a:t> </a:t>
-            </a:r>
-            <a:r>
-              <a:rPr lang="de-DE" dirty="0" err="1" smtClean="0"/>
-              <a:t>typesafe</a:t>
-            </a:r>
-            <a:endParaRPr lang="de-DE" dirty="0" smtClean="0"/>
-          </a:p>
-          <a:p>
-            <a:r>
-              <a:rPr lang="de-DE" dirty="0" err="1" smtClean="0"/>
-              <a:t>Only</a:t>
-            </a:r>
-            <a:r>
-              <a:rPr lang="de-DE" dirty="0" smtClean="0"/>
-              <a:t> </a:t>
-            </a:r>
-            <a:r>
-              <a:rPr lang="de-DE" dirty="0" err="1" smtClean="0"/>
-              <a:t>verify</a:t>
-            </a:r>
-            <a:r>
-              <a:rPr lang="de-DE" dirty="0" smtClean="0"/>
-              <a:t> </a:t>
-            </a:r>
-            <a:r>
-              <a:rPr lang="de-DE" dirty="0" err="1" smtClean="0"/>
-              <a:t>what</a:t>
-            </a:r>
-            <a:r>
-              <a:rPr lang="de-DE" dirty="0" smtClean="0"/>
-              <a:t> </a:t>
-            </a:r>
-            <a:r>
-              <a:rPr lang="de-DE" dirty="0" err="1" smtClean="0"/>
-              <a:t>is</a:t>
-            </a:r>
-            <a:r>
-              <a:rPr lang="de-DE" dirty="0" smtClean="0"/>
-              <a:t> </a:t>
-            </a:r>
-            <a:r>
-              <a:rPr lang="de-DE" dirty="0" err="1" smtClean="0"/>
-              <a:t>really</a:t>
-            </a:r>
-            <a:r>
-              <a:rPr lang="de-DE" dirty="0" smtClean="0"/>
-              <a:t> </a:t>
-            </a:r>
-            <a:r>
-              <a:rPr lang="de-DE" dirty="0" err="1" smtClean="0"/>
-              <a:t>expected</a:t>
-            </a:r>
-            <a:r>
-              <a:rPr lang="de-DE" dirty="0" smtClean="0"/>
-              <a:t> </a:t>
-            </a:r>
-            <a:r>
-              <a:rPr lang="de-DE" dirty="0" err="1" smtClean="0"/>
-              <a:t>and</a:t>
-            </a:r>
-            <a:r>
-              <a:rPr lang="de-DE" dirty="0" smtClean="0"/>
-              <a:t> </a:t>
-            </a:r>
-            <a:r>
-              <a:rPr lang="de-DE" dirty="0" err="1" smtClean="0"/>
-              <a:t>important</a:t>
-            </a:r>
-            <a:r>
-              <a:rPr lang="de-DE" dirty="0" smtClean="0"/>
-              <a:t> </a:t>
-            </a:r>
-            <a:r>
-              <a:rPr lang="de-DE" dirty="0" err="1" smtClean="0"/>
-              <a:t>to</a:t>
-            </a:r>
-            <a:r>
-              <a:rPr lang="de-DE" dirty="0" smtClean="0"/>
-              <a:t> </a:t>
-            </a:r>
-            <a:r>
-              <a:rPr lang="de-DE" dirty="0" err="1" smtClean="0"/>
-              <a:t>be</a:t>
-            </a:r>
-            <a:r>
-              <a:rPr lang="de-DE" dirty="0" smtClean="0"/>
-              <a:t> </a:t>
-            </a:r>
-            <a:r>
-              <a:rPr lang="de-DE" dirty="0" err="1" smtClean="0"/>
-              <a:t>verified</a:t>
-            </a:r>
-            <a:endParaRPr lang="de-DE" dirty="0" smtClean="0"/>
-          </a:p>
-          <a:p>
-            <a:pPr lvl="1"/>
-            <a:r>
-              <a:rPr lang="de-DE" dirty="0" err="1" smtClean="0"/>
-              <a:t>Each</a:t>
-            </a:r>
-            <a:r>
-              <a:rPr lang="de-DE" dirty="0" smtClean="0"/>
-              <a:t> </a:t>
-            </a:r>
-            <a:r>
-              <a:rPr lang="de-DE" dirty="0" err="1" smtClean="0"/>
-              <a:t>verify</a:t>
-            </a:r>
-            <a:r>
-              <a:rPr lang="de-DE" dirty="0" smtClean="0"/>
-              <a:t> </a:t>
-            </a:r>
-            <a:r>
-              <a:rPr lang="de-DE" dirty="0" err="1" smtClean="0"/>
-              <a:t>leads</a:t>
-            </a:r>
-            <a:r>
-              <a:rPr lang="de-DE" dirty="0" smtClean="0"/>
-              <a:t> </a:t>
-            </a:r>
-            <a:r>
-              <a:rPr lang="de-DE" dirty="0" err="1" smtClean="0"/>
-              <a:t>to</a:t>
-            </a:r>
-            <a:r>
-              <a:rPr lang="de-DE" dirty="0" smtClean="0"/>
-              <a:t> </a:t>
-            </a:r>
-            <a:r>
-              <a:rPr lang="de-DE" dirty="0" err="1" smtClean="0"/>
-              <a:t>fixation</a:t>
-            </a:r>
-            <a:r>
-              <a:rPr lang="de-DE" dirty="0" smtClean="0"/>
-              <a:t> </a:t>
-            </a:r>
-            <a:r>
-              <a:rPr lang="de-DE" dirty="0" err="1" smtClean="0"/>
-              <a:t>of</a:t>
-            </a:r>
-            <a:r>
-              <a:rPr lang="de-DE" dirty="0" smtClean="0"/>
-              <a:t> </a:t>
-            </a:r>
-            <a:r>
-              <a:rPr lang="de-DE" dirty="0" err="1" smtClean="0"/>
-              <a:t>the</a:t>
-            </a:r>
-            <a:r>
-              <a:rPr lang="de-DE" dirty="0" smtClean="0"/>
-              <a:t> </a:t>
-            </a:r>
-            <a:r>
-              <a:rPr lang="de-DE" dirty="0" err="1" smtClean="0"/>
-              <a:t>tested</a:t>
-            </a:r>
-            <a:r>
-              <a:rPr lang="de-DE" dirty="0" smtClean="0"/>
-              <a:t> </a:t>
-            </a:r>
-            <a:r>
-              <a:rPr lang="de-DE" dirty="0" err="1" smtClean="0"/>
-              <a:t>source</a:t>
-            </a:r>
-            <a:r>
-              <a:rPr lang="de-DE" dirty="0" smtClean="0"/>
-              <a:t> </a:t>
-            </a:r>
-            <a:r>
-              <a:rPr lang="de-DE" dirty="0" err="1" smtClean="0"/>
-              <a:t>code</a:t>
-            </a:r>
-            <a:endParaRPr lang="de-DE" dirty="0" smtClean="0"/>
-          </a:p>
-        </p:txBody>
-      </p:sp>
-    </p:spTree>
-  </p:cSld>
-  <p:clrMapOvr>
-    <a:masterClrMapping/>
-  </p:clrMapOvr>
-  <p:timing>
-    <p:tnLst>
-      <p:par>
-        <p:cTn id="1" dur="indefinite" restart="never" nodeType="tmRoot">
-          <p:childTnLst>
-            <p:seq concurrent="1" nextAc="seek">
-              <p:cTn id="2" dur="indefinite" nodeType="mainSeq">
-                <p:childTnLst>
-                  <p:par>
-                    <p:cTn id="3" fill="hold">
-                      <p:stCondLst>
-                        <p:cond delay="indefinite"/>
-                      </p:stCondLst>
-                      <p:childTnLst>
-                        <p:par>
-                          <p:cTn id="4" fill="hold">
-                            <p:stCondLst>
-                              <p:cond delay="0"/>
-                            </p:stCondLst>
-                            <p:childTnLst>
-                              <p:par>
-                                <p:cTn id="5" presetID="1" presetClass="entr" presetSubtype="0" fill="hold" nodeType="clickEffect">
-                                  <p:stCondLst>
-                                    <p:cond delay="0"/>
-                                  </p:stCondLst>
-                                  <p:childTnLst>
-                                    <p:set>
-                                      <p:cBhvr>
-                                        <p:cTn id="6" dur="1" fill="hold">
-                                          <p:stCondLst>
-                                            <p:cond delay="0"/>
-                                          </p:stCondLst>
-                                        </p:cTn>
-                                        <p:tgtEl>
-                                          <p:spTgt spid="3">
-                                            <p:txEl>
-                                              <p:pRg st="0" end="0"/>
-                                            </p:txEl>
-                                          </p:spTgt>
-                                        </p:tgtEl>
-                                        <p:attrNameLst>
-                                          <p:attrName>style.visibility</p:attrName>
-                                        </p:attrNameLst>
-                                      </p:cBhvr>
-                                      <p:to>
-                                        <p:strVal val="visible"/>
-                                      </p:to>
-                                    </p:set>
-                                  </p:childTnLst>
-                                </p:cTn>
-                              </p:par>
-                              <p:par>
-                                <p:cTn id="7" presetID="1" presetClass="entr" presetSubtype="0" fill="hold" nodeType="withEffect">
-                                  <p:stCondLst>
-                                    <p:cond delay="0"/>
-                                  </p:stCondLst>
-                                  <p:childTnLst>
-                                    <p:set>
-                                      <p:cBhvr>
-                                        <p:cTn id="8" dur="1" fill="hold">
-                                          <p:stCondLst>
-                                            <p:cond delay="0"/>
-                                          </p:stCondLst>
-                                        </p:cTn>
-                                        <p:tgtEl>
-                                          <p:spTgt spid="3">
-                                            <p:txEl>
-                                              <p:pRg st="1" end="1"/>
-                                            </p:txEl>
-                                          </p:spTgt>
-                                        </p:tgtEl>
-                                        <p:attrNameLst>
-                                          <p:attrName>style.visibility</p:attrName>
-                                        </p:attrNameLst>
-                                      </p:cBhvr>
-                                      <p:to>
-                                        <p:strVal val="visible"/>
-                                      </p:to>
-                                    </p:set>
-                                  </p:childTnLst>
-                                </p:cTn>
-                              </p:par>
-                            </p:childTnLst>
-                          </p:cTn>
-                        </p:par>
-                      </p:childTnLst>
-                    </p:cTn>
-                  </p:par>
-                  <p:par>
-                    <p:cTn id="9" fill="hold">
-                      <p:stCondLst>
-                        <p:cond delay="indefinite"/>
-                      </p:stCondLst>
-                      <p:childTnLst>
-                        <p:par>
-                          <p:cTn id="10" fill="hold">
-                            <p:stCondLst>
-                              <p:cond delay="0"/>
-                            </p:stCondLst>
-                            <p:childTnLst>
-                              <p:par>
-                                <p:cTn id="11" presetID="1" presetClass="entr" presetSubtype="0" fill="hold" nodeType="clickEffect">
-                                  <p:stCondLst>
-                                    <p:cond delay="0"/>
-                                  </p:stCondLst>
-                                  <p:childTnLst>
-                                    <p:set>
-                                      <p:cBhvr>
-                                        <p:cTn id="12" dur="1" fill="hold">
-                                          <p:stCondLst>
-                                            <p:cond delay="0"/>
-                                          </p:stCondLst>
-                                        </p:cTn>
-                                        <p:tgtEl>
-                                          <p:spTgt spid="3">
-                                            <p:txEl>
-                                              <p:pRg st="2" end="2"/>
-                                            </p:txEl>
-                                          </p:spTgt>
-                                        </p:tgtEl>
-                                        <p:attrNameLst>
-                                          <p:attrName>style.visibility</p:attrName>
-                                        </p:attrNameLst>
-                                      </p:cBhvr>
-                                      <p:to>
-                                        <p:strVal val="visible"/>
-                                      </p:to>
-                                    </p:set>
-                                  </p:childTnLst>
-                                </p:cTn>
-                              </p:par>
-                            </p:childTnLst>
-                          </p:cTn>
-                        </p:par>
-                      </p:childTnLst>
-                    </p:cTn>
-                  </p:par>
-                  <p:par>
-                    <p:cTn id="13" fill="hold">
-                      <p:stCondLst>
-                        <p:cond delay="indefinite"/>
-                      </p:stCondLst>
-                      <p:childTnLst>
-                        <p:par>
-                          <p:cTn id="14" fill="hold">
-                            <p:stCondLst>
-                              <p:cond delay="0"/>
-                            </p:stCondLst>
-                            <p:childTnLst>
-                              <p:par>
-                                <p:cTn id="15" presetID="1" presetClass="entr" presetSubtype="0" fill="hold" nodeType="clickEffect">
-                                  <p:stCondLst>
-                                    <p:cond delay="0"/>
-                                  </p:stCondLst>
-                                  <p:childTnLst>
-                                    <p:set>
-                                      <p:cBhvr>
-                                        <p:cTn id="16" dur="1" fill="hold">
-                                          <p:stCondLst>
-                                            <p:cond delay="0"/>
-                                          </p:stCondLst>
-                                        </p:cTn>
-                                        <p:tgtEl>
-                                          <p:spTgt spid="3">
-                                            <p:txEl>
-                                              <p:pRg st="3" end="3"/>
-                                            </p:txEl>
-                                          </p:spTgt>
-                                        </p:tgtEl>
-                                        <p:attrNameLst>
-                                          <p:attrName>style.visibility</p:attrName>
-                                        </p:attrNameLst>
-                                      </p:cBhvr>
-                                      <p:to>
-                                        <p:strVal val="visible"/>
-                                      </p:to>
-                                    </p:set>
-                                  </p:childTnLst>
-                                </p:cTn>
-                              </p:par>
-                            </p:childTnLst>
-                          </p:cTn>
-                        </p:par>
-                      </p:childTnLst>
-                    </p:cTn>
-                  </p:par>
-                </p:childTnLst>
-              </p:cTn>
-              <p:prevCondLst>
-                <p:cond evt="onPrev" delay="0">
-                  <p:tgtEl>
-                    <p:sldTgt/>
-                  </p:tgtEl>
-                </p:cond>
-              </p:prevCondLst>
-              <p:nextCondLst>
-                <p:cond evt="onNext" delay="0">
-                  <p:tgtEl>
-                    <p:sldTgt/>
-                  </p:tgtEl>
-                </p:cond>
-              </p:nextCondLst>
-            </p:seq>
-          </p:childTnLst>
-        </p:cTn>
-      </p:par>
-    </p:tnLst>
-  </p:timing>
-</p:sld>
-</file>
-
-<file path=ppt/slides/slide12.xml><?xml version="1.0" encoding="utf-8"?>
 <p:sld xmlns:a="http://schemas.openxmlformats.org/drawingml/2006/main" xmlns:r="http://schemas.openxmlformats.org/officeDocument/2006/relationships" xmlns:p="http://schemas.openxmlformats.org/presentationml/2006/main">
   <p:cSld>
     <p:spTree>
@@ -7776,8 +7179,53 @@
             </a:r>
             <a:r>
               <a:rPr lang="de-DE" dirty="0" smtClean="0"/>
-              <a:t> real</a:t>
-            </a:r>
+              <a:t> real </a:t>
+            </a:r>
+            <a:r>
+              <a:rPr lang="de-DE" dirty="0" err="1" smtClean="0"/>
+              <a:t>behaviour</a:t>
+            </a:r>
+            <a:r>
+              <a:rPr lang="de-DE" dirty="0" smtClean="0"/>
+              <a:t> </a:t>
+            </a:r>
+            <a:r>
+              <a:rPr lang="de-DE" dirty="0" err="1" smtClean="0"/>
+              <a:t>of</a:t>
+            </a:r>
+            <a:r>
+              <a:rPr lang="de-DE" dirty="0" smtClean="0"/>
+              <a:t> </a:t>
+            </a:r>
+            <a:r>
+              <a:rPr lang="de-DE" dirty="0" err="1" smtClean="0"/>
+              <a:t>the</a:t>
+            </a:r>
+            <a:r>
+              <a:rPr lang="de-DE" dirty="0" smtClean="0"/>
+              <a:t> </a:t>
+            </a:r>
+            <a:r>
+              <a:rPr lang="de-DE" dirty="0" err="1" smtClean="0"/>
+              <a:t>mocked</a:t>
+            </a:r>
+            <a:r>
+              <a:rPr lang="de-DE" dirty="0" smtClean="0"/>
+              <a:t> </a:t>
+            </a:r>
+            <a:r>
+              <a:rPr lang="de-DE" dirty="0" err="1" smtClean="0"/>
+              <a:t>class</a:t>
+            </a:r>
+            <a:r>
+              <a:rPr lang="de-DE" dirty="0" smtClean="0"/>
+              <a:t>/</a:t>
+            </a:r>
+            <a:r>
+              <a:rPr lang="de-DE" dirty="0" err="1" smtClean="0"/>
+              <a:t>interface</a:t>
+            </a:r>
+            <a:endParaRPr lang="de-DE" dirty="0" smtClean="0"/>
           </a:p>
           <a:p>
             <a:r>

</xml_diff>